<commit_message>
all ready including map
</commit_message>
<xml_diff>
--- a/Project 1 Presentation.pptx
+++ b/Project 1 Presentation.pptx
@@ -11,11 +11,15 @@
     <p:sldId id="263" r:id="rId5"/>
     <p:sldId id="259" r:id="rId6"/>
     <p:sldId id="260" r:id="rId7"/>
-    <p:sldId id="261" r:id="rId8"/>
-    <p:sldId id="266" r:id="rId9"/>
-    <p:sldId id="267" r:id="rId10"/>
-    <p:sldId id="262" r:id="rId11"/>
-    <p:sldId id="264" r:id="rId12"/>
+    <p:sldId id="268" r:id="rId8"/>
+    <p:sldId id="269" r:id="rId9"/>
+    <p:sldId id="270" r:id="rId10"/>
+    <p:sldId id="271" r:id="rId11"/>
+    <p:sldId id="261" r:id="rId12"/>
+    <p:sldId id="266" r:id="rId13"/>
+    <p:sldId id="267" r:id="rId14"/>
+    <p:sldId id="262" r:id="rId15"/>
+    <p:sldId id="264" r:id="rId16"/>
   </p:sldIdLst>
   <p:sldSz cx="12192000" cy="6858000"/>
   <p:notesSz cx="6858000" cy="9144000"/>
@@ -368,7 +372,7 @@
             <a:fld id="{B61BEF0D-F0BB-DE4B-95CE-6DB70DBA9567}" type="datetimeFigureOut">
               <a:rPr lang="en-US" dirty="0"/>
               <a:pPr/>
-              <a:t>7/27/19</a:t>
+              <a:t>7/28/19</a:t>
             </a:fld>
             <a:endParaRPr lang="en-US" dirty="0"/>
           </a:p>
@@ -627,7 +631,7 @@
             <a:fld id="{B61BEF0D-F0BB-DE4B-95CE-6DB70DBA9567}" type="datetimeFigureOut">
               <a:rPr lang="en-US" dirty="0"/>
               <a:pPr/>
-              <a:t>7/27/19</a:t>
+              <a:t>7/28/19</a:t>
             </a:fld>
             <a:endParaRPr lang="en-US" dirty="0"/>
           </a:p>
@@ -859,7 +863,7 @@
             <a:fld id="{B61BEF0D-F0BB-DE4B-95CE-6DB70DBA9567}" type="datetimeFigureOut">
               <a:rPr lang="en-US" dirty="0"/>
               <a:pPr/>
-              <a:t>7/27/19</a:t>
+              <a:t>7/28/19</a:t>
             </a:fld>
             <a:endParaRPr lang="en-US" dirty="0"/>
           </a:p>
@@ -1096,7 +1100,7 @@
             <a:fld id="{B61BEF0D-F0BB-DE4B-95CE-6DB70DBA9567}" type="datetimeFigureOut">
               <a:rPr lang="en-US" dirty="0"/>
               <a:pPr/>
-              <a:t>7/27/19</a:t>
+              <a:t>7/28/19</a:t>
             </a:fld>
             <a:endParaRPr lang="en-US" dirty="0"/>
           </a:p>
@@ -1400,7 +1404,7 @@
             <a:fld id="{B61BEF0D-F0BB-DE4B-95CE-6DB70DBA9567}" type="datetimeFigureOut">
               <a:rPr lang="en-US" dirty="0"/>
               <a:pPr/>
-              <a:t>7/27/19</a:t>
+              <a:t>7/28/19</a:t>
             </a:fld>
             <a:endParaRPr lang="en-US" dirty="0"/>
           </a:p>
@@ -1699,7 +1703,7 @@
             <a:fld id="{B61BEF0D-F0BB-DE4B-95CE-6DB70DBA9567}" type="datetimeFigureOut">
               <a:rPr lang="en-US" dirty="0"/>
               <a:pPr/>
-              <a:t>7/27/19</a:t>
+              <a:t>7/28/19</a:t>
             </a:fld>
             <a:endParaRPr lang="en-US" dirty="0"/>
           </a:p>
@@ -2118,7 +2122,7 @@
             <a:fld id="{B61BEF0D-F0BB-DE4B-95CE-6DB70DBA9567}" type="datetimeFigureOut">
               <a:rPr lang="en-US" dirty="0"/>
               <a:pPr/>
-              <a:t>7/27/19</a:t>
+              <a:t>7/28/19</a:t>
             </a:fld>
             <a:endParaRPr lang="en-US" dirty="0"/>
           </a:p>
@@ -2277,7 +2281,7 @@
             <a:fld id="{B61BEF0D-F0BB-DE4B-95CE-6DB70DBA9567}" type="datetimeFigureOut">
               <a:rPr lang="en-US" dirty="0"/>
               <a:pPr/>
-              <a:t>7/27/19</a:t>
+              <a:t>7/28/19</a:t>
             </a:fld>
             <a:endParaRPr lang="en-US" dirty="0"/>
           </a:p>
@@ -2369,7 +2373,7 @@
             <a:fld id="{B61BEF0D-F0BB-DE4B-95CE-6DB70DBA9567}" type="datetimeFigureOut">
               <a:rPr lang="en-US" dirty="0"/>
               <a:pPr/>
-              <a:t>7/27/19</a:t>
+              <a:t>7/28/19</a:t>
             </a:fld>
             <a:endParaRPr lang="en-US" dirty="0"/>
           </a:p>
@@ -2744,7 +2748,7 @@
             <a:fld id="{B61BEF0D-F0BB-DE4B-95CE-6DB70DBA9567}" type="datetimeFigureOut">
               <a:rPr lang="en-US" dirty="0"/>
               <a:pPr/>
-              <a:t>7/27/19</a:t>
+              <a:t>7/28/19</a:t>
             </a:fld>
             <a:endParaRPr lang="en-US" dirty="0"/>
           </a:p>
@@ -3030,7 +3034,7 @@
             <a:fld id="{B61BEF0D-F0BB-DE4B-95CE-6DB70DBA9567}" type="datetimeFigureOut">
               <a:rPr lang="en-US" dirty="0"/>
               <a:pPr/>
-              <a:t>7/27/19</a:t>
+              <a:t>7/28/19</a:t>
             </a:fld>
             <a:endParaRPr lang="en-US" dirty="0"/>
           </a:p>
@@ -3238,7 +3242,7 @@
             <a:fld id="{B61BEF0D-F0BB-DE4B-95CE-6DB70DBA9567}" type="datetimeFigureOut">
               <a:rPr lang="en-US" dirty="0"/>
               <a:pPr/>
-              <a:t>7/27/19</a:t>
+              <a:t>7/28/19</a:t>
             </a:fld>
             <a:endParaRPr lang="en-US" dirty="0"/>
           </a:p>
@@ -3936,6 +3940,559 @@
       </p:grpSpPr>
       <p:sp>
         <p:nvSpPr>
+          <p:cNvPr id="4" name="Title 3">
+            <a:extLst>
+              <a:ext uri="{FF2B5EF4-FFF2-40B4-BE49-F238E27FC236}">
+                <a16:creationId xmlns:a16="http://schemas.microsoft.com/office/drawing/2014/main" id="{CD482390-4F8A-BB48-A58F-E930BD919D1B}"/>
+              </a:ext>
+            </a:extLst>
+          </p:cNvPr>
+          <p:cNvSpPr>
+            <a:spLocks noGrp="1"/>
+          </p:cNvSpPr>
+          <p:nvPr>
+            <p:ph type="title"/>
+          </p:nvPr>
+        </p:nvSpPr>
+        <p:spPr/>
+        <p:txBody>
+          <a:bodyPr/>
+          <a:lstStyle/>
+          <a:p>
+            <a:r>
+              <a:rPr lang="en-US" dirty="0"/>
+              <a:t>Cont’d</a:t>
+            </a:r>
+          </a:p>
+        </p:txBody>
+      </p:sp>
+      <p:sp>
+        <p:nvSpPr>
+          <p:cNvPr id="5" name="Text Placeholder 4">
+            <a:extLst>
+              <a:ext uri="{FF2B5EF4-FFF2-40B4-BE49-F238E27FC236}">
+                <a16:creationId xmlns:a16="http://schemas.microsoft.com/office/drawing/2014/main" id="{2ABDB8A0-0C18-0A4D-BF43-89B8D020F3F8}"/>
+              </a:ext>
+            </a:extLst>
+          </p:cNvPr>
+          <p:cNvSpPr>
+            <a:spLocks noGrp="1"/>
+          </p:cNvSpPr>
+          <p:nvPr>
+            <p:ph type="body" idx="1"/>
+          </p:nvPr>
+        </p:nvSpPr>
+        <p:spPr/>
+        <p:txBody>
+          <a:bodyPr/>
+          <a:lstStyle/>
+          <a:p>
+            <a:r>
+              <a:rPr lang="en-US" dirty="0"/>
+              <a:t>upward</a:t>
+            </a:r>
+          </a:p>
+        </p:txBody>
+      </p:sp>
+      <p:pic>
+        <p:nvPicPr>
+          <p:cNvPr id="10" name="Content Placeholder 9">
+            <a:extLst>
+              <a:ext uri="{FF2B5EF4-FFF2-40B4-BE49-F238E27FC236}">
+                <a16:creationId xmlns:a16="http://schemas.microsoft.com/office/drawing/2014/main" id="{A0A526B7-6745-C540-80C4-A589FE44121C}"/>
+              </a:ext>
+            </a:extLst>
+          </p:cNvPr>
+          <p:cNvPicPr>
+            <a:picLocks noGrp="1" noChangeAspect="1"/>
+          </p:cNvPicPr>
+          <p:nvPr>
+            <p:ph sz="half" idx="2"/>
+          </p:nvPr>
+        </p:nvPicPr>
+        <p:blipFill>
+          <a:blip r:embed="rId2"/>
+          <a:stretch>
+            <a:fillRect/>
+          </a:stretch>
+        </p:blipFill>
+        <p:spPr>
+          <a:xfrm>
+            <a:off x="831321" y="2925763"/>
+            <a:ext cx="4892145" cy="2935287"/>
+          </a:xfrm>
+        </p:spPr>
+      </p:pic>
+      <p:sp>
+        <p:nvSpPr>
+          <p:cNvPr id="7" name="Text Placeholder 6">
+            <a:extLst>
+              <a:ext uri="{FF2B5EF4-FFF2-40B4-BE49-F238E27FC236}">
+                <a16:creationId xmlns:a16="http://schemas.microsoft.com/office/drawing/2014/main" id="{F183262E-5B46-4042-AD82-65956F6E55DF}"/>
+              </a:ext>
+            </a:extLst>
+          </p:cNvPr>
+          <p:cNvSpPr>
+            <a:spLocks noGrp="1"/>
+          </p:cNvSpPr>
+          <p:nvPr>
+            <p:ph type="body" sz="quarter" idx="3"/>
+          </p:nvPr>
+        </p:nvSpPr>
+        <p:spPr/>
+        <p:txBody>
+          <a:bodyPr/>
+          <a:lstStyle/>
+          <a:p>
+            <a:r>
+              <a:rPr lang="en-US" dirty="0"/>
+              <a:t>stable</a:t>
+            </a:r>
+          </a:p>
+        </p:txBody>
+      </p:sp>
+      <p:pic>
+        <p:nvPicPr>
+          <p:cNvPr id="12" name="Content Placeholder 11">
+            <a:extLst>
+              <a:ext uri="{FF2B5EF4-FFF2-40B4-BE49-F238E27FC236}">
+                <a16:creationId xmlns:a16="http://schemas.microsoft.com/office/drawing/2014/main" id="{F3329642-F8FA-3F4B-9871-F494270471C4}"/>
+              </a:ext>
+            </a:extLst>
+          </p:cNvPr>
+          <p:cNvPicPr>
+            <a:picLocks noGrp="1" noChangeAspect="1"/>
+          </p:cNvPicPr>
+          <p:nvPr>
+            <p:ph sz="quarter" idx="4"/>
+          </p:nvPr>
+        </p:nvPicPr>
+        <p:blipFill>
+          <a:blip r:embed="rId3"/>
+          <a:stretch>
+            <a:fillRect/>
+          </a:stretch>
+        </p:blipFill>
+        <p:spPr>
+          <a:xfrm>
+            <a:off x="6468534" y="2925763"/>
+            <a:ext cx="4892145" cy="2935287"/>
+          </a:xfrm>
+        </p:spPr>
+      </p:pic>
+    </p:spTree>
+    <p:extLst>
+      <p:ext uri="{BB962C8B-B14F-4D97-AF65-F5344CB8AC3E}">
+        <p14:creationId xmlns:p14="http://schemas.microsoft.com/office/powerpoint/2010/main" val="1465925915"/>
+      </p:ext>
+    </p:extLst>
+  </p:cSld>
+  <p:clrMapOvr>
+    <a:masterClrMapping/>
+  </p:clrMapOvr>
+</p:sld>
+</file>
+
+<file path=ppt/slides/slide11.xml><?xml version="1.0" encoding="utf-8"?>
+<p:sld xmlns:a="http://schemas.openxmlformats.org/drawingml/2006/main" xmlns:r="http://schemas.openxmlformats.org/officeDocument/2006/relationships" xmlns:p="http://schemas.openxmlformats.org/presentationml/2006/main">
+  <p:cSld>
+    <p:spTree>
+      <p:nvGrpSpPr>
+        <p:cNvPr id="1" name=""/>
+        <p:cNvGrpSpPr/>
+        <p:nvPr/>
+      </p:nvGrpSpPr>
+      <p:grpSpPr>
+        <a:xfrm>
+          <a:off x="0" y="0"/>
+          <a:ext cx="0" cy="0"/>
+          <a:chOff x="0" y="0"/>
+          <a:chExt cx="0" cy="0"/>
+        </a:xfrm>
+      </p:grpSpPr>
+      <p:sp>
+        <p:nvSpPr>
+          <p:cNvPr id="2" name="Title 1">
+            <a:extLst>
+              <a:ext uri="{FF2B5EF4-FFF2-40B4-BE49-F238E27FC236}">
+                <a16:creationId xmlns:a16="http://schemas.microsoft.com/office/drawing/2014/main" id="{7772DE01-3976-6141-852B-A445813FCE85}"/>
+              </a:ext>
+            </a:extLst>
+          </p:cNvPr>
+          <p:cNvSpPr>
+            <a:spLocks noGrp="1"/>
+          </p:cNvSpPr>
+          <p:nvPr>
+            <p:ph type="title"/>
+          </p:nvPr>
+        </p:nvSpPr>
+        <p:spPr/>
+        <p:txBody>
+          <a:bodyPr/>
+          <a:lstStyle/>
+          <a:p>
+            <a:r>
+              <a:rPr lang="en-US" dirty="0"/>
+              <a:t>Jobs Counts in the top Industries</a:t>
+            </a:r>
+          </a:p>
+        </p:txBody>
+      </p:sp>
+      <p:sp>
+        <p:nvSpPr>
+          <p:cNvPr id="3" name="Content Placeholder 2">
+            <a:extLst>
+              <a:ext uri="{FF2B5EF4-FFF2-40B4-BE49-F238E27FC236}">
+                <a16:creationId xmlns:a16="http://schemas.microsoft.com/office/drawing/2014/main" id="{0784CB64-1A68-3A47-B46B-9273652DEFF9}"/>
+              </a:ext>
+            </a:extLst>
+          </p:cNvPr>
+          <p:cNvSpPr>
+            <a:spLocks noGrp="1"/>
+          </p:cNvSpPr>
+          <p:nvPr>
+            <p:ph idx="1"/>
+          </p:nvPr>
+        </p:nvSpPr>
+        <p:spPr>
+          <a:xfrm>
+            <a:off x="581192" y="2180496"/>
+            <a:ext cx="3859247" cy="3678303"/>
+          </a:xfrm>
+        </p:spPr>
+        <p:txBody>
+          <a:bodyPr/>
+          <a:lstStyle/>
+          <a:p>
+            <a:r>
+              <a:rPr lang="en-US" dirty="0"/>
+              <a:t>What is the distribution of “data jobs” in different industries?</a:t>
+            </a:r>
+          </a:p>
+          <a:p>
+            <a:r>
+              <a:rPr lang="en-US" dirty="0"/>
+              <a:t>Graph of total job counts in each industry</a:t>
+            </a:r>
+          </a:p>
+        </p:txBody>
+      </p:sp>
+      <p:pic>
+        <p:nvPicPr>
+          <p:cNvPr id="5" name="Picture 4">
+            <a:extLst>
+              <a:ext uri="{FF2B5EF4-FFF2-40B4-BE49-F238E27FC236}">
+                <a16:creationId xmlns:a16="http://schemas.microsoft.com/office/drawing/2014/main" id="{635F06A1-B68A-3543-8978-B769CC863FA8}"/>
+              </a:ext>
+            </a:extLst>
+          </p:cNvPr>
+          <p:cNvPicPr>
+            <a:picLocks noChangeAspect="1"/>
+          </p:cNvPicPr>
+          <p:nvPr/>
+        </p:nvPicPr>
+        <p:blipFill>
+          <a:blip r:embed="rId2"/>
+          <a:stretch>
+            <a:fillRect/>
+          </a:stretch>
+        </p:blipFill>
+        <p:spPr>
+          <a:xfrm>
+            <a:off x="4440439" y="2180496"/>
+            <a:ext cx="7170368" cy="4057650"/>
+          </a:xfrm>
+          <a:prstGeom prst="rect">
+            <a:avLst/>
+          </a:prstGeom>
+        </p:spPr>
+      </p:pic>
+    </p:spTree>
+    <p:extLst>
+      <p:ext uri="{BB962C8B-B14F-4D97-AF65-F5344CB8AC3E}">
+        <p14:creationId xmlns:p14="http://schemas.microsoft.com/office/powerpoint/2010/main" val="3134922895"/>
+      </p:ext>
+    </p:extLst>
+  </p:cSld>
+  <p:clrMapOvr>
+    <a:masterClrMapping/>
+  </p:clrMapOvr>
+</p:sld>
+</file>
+
+<file path=ppt/slides/slide12.xml><?xml version="1.0" encoding="utf-8"?>
+<p:sld xmlns:a="http://schemas.openxmlformats.org/drawingml/2006/main" xmlns:r="http://schemas.openxmlformats.org/officeDocument/2006/relationships" xmlns:p="http://schemas.openxmlformats.org/presentationml/2006/main">
+  <p:cSld>
+    <p:spTree>
+      <p:nvGrpSpPr>
+        <p:cNvPr id="1" name=""/>
+        <p:cNvGrpSpPr/>
+        <p:nvPr/>
+      </p:nvGrpSpPr>
+      <p:grpSpPr>
+        <a:xfrm>
+          <a:off x="0" y="0"/>
+          <a:ext cx="0" cy="0"/>
+          <a:chOff x="0" y="0"/>
+          <a:chExt cx="0" cy="0"/>
+        </a:xfrm>
+      </p:grpSpPr>
+      <p:sp>
+        <p:nvSpPr>
+          <p:cNvPr id="2" name="Title 1">
+            <a:extLst>
+              <a:ext uri="{FF2B5EF4-FFF2-40B4-BE49-F238E27FC236}">
+                <a16:creationId xmlns:a16="http://schemas.microsoft.com/office/drawing/2014/main" id="{7772DE01-3976-6141-852B-A445813FCE85}"/>
+              </a:ext>
+            </a:extLst>
+          </p:cNvPr>
+          <p:cNvSpPr>
+            <a:spLocks noGrp="1"/>
+          </p:cNvSpPr>
+          <p:nvPr>
+            <p:ph type="title"/>
+          </p:nvPr>
+        </p:nvSpPr>
+        <p:spPr/>
+        <p:txBody>
+          <a:bodyPr/>
+          <a:lstStyle/>
+          <a:p>
+            <a:r>
+              <a:rPr lang="en-US" dirty="0"/>
+              <a:t>Salaries in the top Industries</a:t>
+            </a:r>
+          </a:p>
+        </p:txBody>
+      </p:sp>
+      <p:sp>
+        <p:nvSpPr>
+          <p:cNvPr id="3" name="Content Placeholder 2">
+            <a:extLst>
+              <a:ext uri="{FF2B5EF4-FFF2-40B4-BE49-F238E27FC236}">
+                <a16:creationId xmlns:a16="http://schemas.microsoft.com/office/drawing/2014/main" id="{0784CB64-1A68-3A47-B46B-9273652DEFF9}"/>
+              </a:ext>
+            </a:extLst>
+          </p:cNvPr>
+          <p:cNvSpPr>
+            <a:spLocks noGrp="1"/>
+          </p:cNvSpPr>
+          <p:nvPr>
+            <p:ph idx="1"/>
+          </p:nvPr>
+        </p:nvSpPr>
+        <p:spPr>
+          <a:xfrm>
+            <a:off x="581192" y="2180496"/>
+            <a:ext cx="3859247" cy="3678303"/>
+          </a:xfrm>
+        </p:spPr>
+        <p:txBody>
+          <a:bodyPr/>
+          <a:lstStyle/>
+          <a:p>
+            <a:r>
+              <a:rPr lang="en-US" dirty="0"/>
+              <a:t>What is the distribution of “data jobs” in different industries?</a:t>
+            </a:r>
+          </a:p>
+          <a:p>
+            <a:r>
+              <a:rPr lang="en-US" dirty="0"/>
+              <a:t>Graph of total job counts in each industry</a:t>
+            </a:r>
+          </a:p>
+        </p:txBody>
+      </p:sp>
+      <p:pic>
+        <p:nvPicPr>
+          <p:cNvPr id="6" name="Picture 5">
+            <a:extLst>
+              <a:ext uri="{FF2B5EF4-FFF2-40B4-BE49-F238E27FC236}">
+                <a16:creationId xmlns:a16="http://schemas.microsoft.com/office/drawing/2014/main" id="{BFC497FA-6A36-6849-9ADA-154239CFF4EB}"/>
+              </a:ext>
+            </a:extLst>
+          </p:cNvPr>
+          <p:cNvPicPr>
+            <a:picLocks noChangeAspect="1"/>
+          </p:cNvPicPr>
+          <p:nvPr/>
+        </p:nvPicPr>
+        <p:blipFill>
+          <a:blip r:embed="rId2"/>
+          <a:stretch>
+            <a:fillRect/>
+          </a:stretch>
+        </p:blipFill>
+        <p:spPr>
+          <a:xfrm>
+            <a:off x="4440439" y="2180496"/>
+            <a:ext cx="7280772" cy="4078902"/>
+          </a:xfrm>
+          <a:prstGeom prst="rect">
+            <a:avLst/>
+          </a:prstGeom>
+        </p:spPr>
+      </p:pic>
+    </p:spTree>
+    <p:extLst>
+      <p:ext uri="{BB962C8B-B14F-4D97-AF65-F5344CB8AC3E}">
+        <p14:creationId xmlns:p14="http://schemas.microsoft.com/office/powerpoint/2010/main" val="3532044637"/>
+      </p:ext>
+    </p:extLst>
+  </p:cSld>
+  <p:clrMapOvr>
+    <a:masterClrMapping/>
+  </p:clrMapOvr>
+</p:sld>
+</file>
+
+<file path=ppt/slides/slide13.xml><?xml version="1.0" encoding="utf-8"?>
+<p:sld xmlns:a="http://schemas.openxmlformats.org/drawingml/2006/main" xmlns:r="http://schemas.openxmlformats.org/officeDocument/2006/relationships" xmlns:p="http://schemas.openxmlformats.org/presentationml/2006/main">
+  <p:cSld>
+    <p:spTree>
+      <p:nvGrpSpPr>
+        <p:cNvPr id="1" name=""/>
+        <p:cNvGrpSpPr/>
+        <p:nvPr/>
+      </p:nvGrpSpPr>
+      <p:grpSpPr>
+        <a:xfrm>
+          <a:off x="0" y="0"/>
+          <a:ext cx="0" cy="0"/>
+          <a:chOff x="0" y="0"/>
+          <a:chExt cx="0" cy="0"/>
+        </a:xfrm>
+      </p:grpSpPr>
+      <p:sp>
+        <p:nvSpPr>
+          <p:cNvPr id="2" name="Title 1">
+            <a:extLst>
+              <a:ext uri="{FF2B5EF4-FFF2-40B4-BE49-F238E27FC236}">
+                <a16:creationId xmlns:a16="http://schemas.microsoft.com/office/drawing/2014/main" id="{7772DE01-3976-6141-852B-A445813FCE85}"/>
+              </a:ext>
+            </a:extLst>
+          </p:cNvPr>
+          <p:cNvSpPr>
+            <a:spLocks noGrp="1"/>
+          </p:cNvSpPr>
+          <p:nvPr>
+            <p:ph type="title"/>
+          </p:nvPr>
+        </p:nvSpPr>
+        <p:spPr/>
+        <p:txBody>
+          <a:bodyPr/>
+          <a:lstStyle/>
+          <a:p>
+            <a:r>
+              <a:rPr lang="en-US" dirty="0"/>
+              <a:t>Data Analyst Salaries in the Top Industries</a:t>
+            </a:r>
+          </a:p>
+        </p:txBody>
+      </p:sp>
+      <p:sp>
+        <p:nvSpPr>
+          <p:cNvPr id="3" name="Content Placeholder 2">
+            <a:extLst>
+              <a:ext uri="{FF2B5EF4-FFF2-40B4-BE49-F238E27FC236}">
+                <a16:creationId xmlns:a16="http://schemas.microsoft.com/office/drawing/2014/main" id="{0784CB64-1A68-3A47-B46B-9273652DEFF9}"/>
+              </a:ext>
+            </a:extLst>
+          </p:cNvPr>
+          <p:cNvSpPr>
+            <a:spLocks noGrp="1"/>
+          </p:cNvSpPr>
+          <p:nvPr>
+            <p:ph idx="1"/>
+          </p:nvPr>
+        </p:nvSpPr>
+        <p:spPr>
+          <a:xfrm>
+            <a:off x="581192" y="2180496"/>
+            <a:ext cx="3859247" cy="3678303"/>
+          </a:xfrm>
+        </p:spPr>
+        <p:txBody>
+          <a:bodyPr/>
+          <a:lstStyle/>
+          <a:p>
+            <a:r>
+              <a:rPr lang="en-US" dirty="0"/>
+              <a:t>What is the distribution of “data jobs” in different industries?</a:t>
+            </a:r>
+          </a:p>
+          <a:p>
+            <a:r>
+              <a:rPr lang="en-US" dirty="0"/>
+              <a:t>Graph of total job counts in each industry</a:t>
+            </a:r>
+          </a:p>
+        </p:txBody>
+      </p:sp>
+      <p:pic>
+        <p:nvPicPr>
+          <p:cNvPr id="5" name="Picture 4">
+            <a:extLst>
+              <a:ext uri="{FF2B5EF4-FFF2-40B4-BE49-F238E27FC236}">
+                <a16:creationId xmlns:a16="http://schemas.microsoft.com/office/drawing/2014/main" id="{CBC0B245-D9A9-154A-AE4B-C722B7CF34F4}"/>
+              </a:ext>
+            </a:extLst>
+          </p:cNvPr>
+          <p:cNvPicPr>
+            <a:picLocks noChangeAspect="1"/>
+          </p:cNvPicPr>
+          <p:nvPr/>
+        </p:nvPicPr>
+        <p:blipFill>
+          <a:blip r:embed="rId2"/>
+          <a:stretch>
+            <a:fillRect/>
+          </a:stretch>
+        </p:blipFill>
+        <p:spPr>
+          <a:xfrm>
+            <a:off x="4440439" y="2162071"/>
+            <a:ext cx="7372974" cy="4153887"/>
+          </a:xfrm>
+          <a:prstGeom prst="rect">
+            <a:avLst/>
+          </a:prstGeom>
+        </p:spPr>
+      </p:pic>
+    </p:spTree>
+    <p:extLst>
+      <p:ext uri="{BB962C8B-B14F-4D97-AF65-F5344CB8AC3E}">
+        <p14:creationId xmlns:p14="http://schemas.microsoft.com/office/powerpoint/2010/main" val="492431831"/>
+      </p:ext>
+    </p:extLst>
+  </p:cSld>
+  <p:clrMapOvr>
+    <a:masterClrMapping/>
+  </p:clrMapOvr>
+</p:sld>
+</file>
+
+<file path=ppt/slides/slide14.xml><?xml version="1.0" encoding="utf-8"?>
+<p:sld xmlns:a="http://schemas.openxmlformats.org/drawingml/2006/main" xmlns:r="http://schemas.openxmlformats.org/officeDocument/2006/relationships" xmlns:p="http://schemas.openxmlformats.org/presentationml/2006/main">
+  <p:cSld>
+    <p:spTree>
+      <p:nvGrpSpPr>
+        <p:cNvPr id="1" name=""/>
+        <p:cNvGrpSpPr/>
+        <p:nvPr/>
+      </p:nvGrpSpPr>
+      <p:grpSpPr>
+        <a:xfrm>
+          <a:off x="0" y="0"/>
+          <a:ext cx="0" cy="0"/>
+          <a:chOff x="0" y="0"/>
+          <a:chExt cx="0" cy="0"/>
+        </a:xfrm>
+      </p:grpSpPr>
+      <p:sp>
+        <p:nvSpPr>
           <p:cNvPr id="2" name="Title 1">
             <a:extLst>
               <a:ext uri="{FF2B5EF4-FFF2-40B4-BE49-F238E27FC236}">
@@ -4015,7 +4572,7 @@
 </p:sld>
 </file>
 
-<file path=ppt/slides/slide11.xml><?xml version="1.0" encoding="utf-8"?>
+<file path=ppt/slides/slide15.xml><?xml version="1.0" encoding="utf-8"?>
 <p:sld xmlns:a="http://schemas.openxmlformats.org/drawingml/2006/main" xmlns:r="http://schemas.openxmlformats.org/officeDocument/2006/relationships" xmlns:p="http://schemas.openxmlformats.org/presentationml/2006/main">
   <p:cSld>
     <p:spTree>
@@ -4615,7 +5172,7 @@
           <p:cNvPr id="2" name="Title 1">
             <a:extLst>
               <a:ext uri="{FF2B5EF4-FFF2-40B4-BE49-F238E27FC236}">
-                <a16:creationId xmlns:a16="http://schemas.microsoft.com/office/drawing/2014/main" id="{7772DE01-3976-6141-852B-A445813FCE85}"/>
+                <a16:creationId xmlns:a16="http://schemas.microsoft.com/office/drawing/2014/main" id="{F9770C42-0583-8F4D-99F8-1EB35B493381}"/>
               </a:ext>
             </a:extLst>
           </p:cNvPr>
@@ -4633,7 +5190,7 @@
           <a:p>
             <a:r>
               <a:rPr lang="en-US" dirty="0"/>
-              <a:t>Jobs Counts in the top Industries</a:t>
+              <a:t>Job  type  vs skills</a:t>
             </a:r>
           </a:p>
         </p:txBody>
@@ -4643,7 +5200,7 @@
           <p:cNvPr id="3" name="Content Placeholder 2">
             <a:extLst>
               <a:ext uri="{FF2B5EF4-FFF2-40B4-BE49-F238E27FC236}">
-                <a16:creationId xmlns:a16="http://schemas.microsoft.com/office/drawing/2014/main" id="{0784CB64-1A68-3A47-B46B-9273652DEFF9}"/>
+                <a16:creationId xmlns:a16="http://schemas.microsoft.com/office/drawing/2014/main" id="{2B1FD29F-4FCB-3B4E-9346-0462C0C6951F}"/>
               </a:ext>
             </a:extLst>
           </p:cNvPr>
@@ -4651,66 +5208,274 @@
             <a:spLocks noGrp="1"/>
           </p:cNvSpPr>
           <p:nvPr>
-            <p:ph idx="1"/>
-          </p:nvPr>
-        </p:nvSpPr>
-        <p:spPr>
-          <a:xfrm>
-            <a:off x="581192" y="2180496"/>
-            <a:ext cx="3859247" cy="3678303"/>
-          </a:xfrm>
-        </p:spPr>
-        <p:txBody>
-          <a:bodyPr/>
-          <a:lstStyle/>
-          <a:p>
-            <a:r>
-              <a:rPr lang="en-US" dirty="0"/>
-              <a:t>What is the distribution of “data jobs” in different industries?</a:t>
-            </a:r>
-          </a:p>
-          <a:p>
-            <a:r>
-              <a:rPr lang="en-US" dirty="0"/>
-              <a:t>Graph of total job counts in each industry</a:t>
-            </a:r>
-          </a:p>
-        </p:txBody>
-      </p:sp>
-      <p:pic>
-        <p:nvPicPr>
-          <p:cNvPr id="5" name="Picture 4">
+            <p:ph sz="half" idx="1"/>
+          </p:nvPr>
+        </p:nvSpPr>
+        <p:spPr/>
+        <p:txBody>
+          <a:bodyPr/>
+          <a:lstStyle/>
+          <a:p>
+            <a:r>
+              <a:rPr lang="en-US" dirty="0"/>
+              <a:t>Job type </a:t>
+            </a:r>
+          </a:p>
+          <a:p>
+            <a:pPr marL="0" indent="0">
+              <a:buNone/>
+            </a:pPr>
+            <a:r>
+              <a:rPr lang="en-US" dirty="0"/>
+              <a:t>     Data Analyst, </a:t>
+            </a:r>
+          </a:p>
+          <a:p>
+            <a:r>
+              <a:rPr lang="en-US" dirty="0"/>
+              <a:t>Skills of interest </a:t>
+            </a:r>
+          </a:p>
+          <a:p>
+            <a:r>
+              <a:rPr lang="en-US" dirty="0"/>
+              <a:t>Data cleaning</a:t>
+            </a:r>
+          </a:p>
+          <a:p>
+            <a:pPr marL="0" indent="0">
+              <a:buNone/>
+            </a:pPr>
+            <a:r>
+              <a:rPr lang="en-US" dirty="0"/>
+              <a:t>     python pandas</a:t>
+            </a:r>
+          </a:p>
+          <a:p>
+            <a:r>
+              <a:rPr lang="en-US" dirty="0"/>
+              <a:t>Data Analysis (Chi-square test)</a:t>
+            </a:r>
+          </a:p>
+          <a:p>
+            <a:pPr marL="0" indent="0">
+              <a:buNone/>
+            </a:pPr>
+            <a:r>
+              <a:rPr lang="en-US" dirty="0"/>
+              <a:t>    Observed=</a:t>
+            </a:r>
+          </a:p>
+          <a:p>
+            <a:pPr marL="0" indent="0">
+              <a:buNone/>
+            </a:pPr>
+            <a:r>
+              <a:rPr lang="en-US" dirty="0"/>
+              <a:t>    expected = </a:t>
+            </a:r>
+          </a:p>
+          <a:p>
+            <a:pPr marL="0" indent="0">
+              <a:buNone/>
+            </a:pPr>
+            <a:r>
+              <a:rPr lang="en-US" dirty="0"/>
+              <a:t>     </a:t>
+            </a:r>
+          </a:p>
+        </p:txBody>
+      </p:sp>
+      <p:graphicFrame>
+        <p:nvGraphicFramePr>
+          <p:cNvPr id="5" name="Content Placeholder 4">
             <a:extLst>
               <a:ext uri="{FF2B5EF4-FFF2-40B4-BE49-F238E27FC236}">
-                <a16:creationId xmlns:a16="http://schemas.microsoft.com/office/drawing/2014/main" id="{635F06A1-B68A-3543-8978-B769CC863FA8}"/>
+                <a16:creationId xmlns:a16="http://schemas.microsoft.com/office/drawing/2014/main" id="{0A3B99FF-6388-564A-9894-5B21CC2EF74C}"/>
               </a:ext>
             </a:extLst>
           </p:cNvPr>
-          <p:cNvPicPr>
-            <a:picLocks noChangeAspect="1"/>
-          </p:cNvPicPr>
-          <p:nvPr/>
-        </p:nvPicPr>
-        <p:blipFill>
-          <a:blip r:embed="rId2"/>
-          <a:stretch>
-            <a:fillRect/>
-          </a:stretch>
-        </p:blipFill>
-        <p:spPr>
-          <a:xfrm>
-            <a:off x="4440439" y="2180496"/>
-            <a:ext cx="7170368" cy="4057650"/>
-          </a:xfrm>
-          <a:prstGeom prst="rect">
-            <a:avLst/>
-          </a:prstGeom>
-        </p:spPr>
-      </p:pic>
+          <p:cNvGraphicFramePr>
+            <a:graphicFrameLocks noGrp="1"/>
+          </p:cNvGraphicFramePr>
+          <p:nvPr>
+            <p:ph sz="half" idx="2"/>
+            <p:extLst>
+              <p:ext uri="{D42A27DB-BD31-4B8C-83A1-F6EECF244321}">
+                <p14:modId xmlns:p14="http://schemas.microsoft.com/office/powerpoint/2010/main" val="2662103898"/>
+              </p:ext>
+            </p:extLst>
+          </p:nvPr>
+        </p:nvGraphicFramePr>
+        <p:xfrm>
+          <a:off x="6188075" y="2227263"/>
+          <a:ext cx="5422900" cy="741680"/>
+        </p:xfrm>
+        <a:graphic>
+          <a:graphicData uri="http://schemas.openxmlformats.org/drawingml/2006/table">
+            <a:tbl>
+              <a:tblPr firstRow="1" bandRow="1">
+                <a:tableStyleId>{5C22544A-7EE6-4342-B048-85BDC9FD1C3A}</a:tableStyleId>
+              </a:tblPr>
+              <a:tblGrid>
+                <a:gridCol w="1084580">
+                  <a:extLst>
+                    <a:ext uri="{9D8B030D-6E8A-4147-A177-3AD203B41FA5}">
+                      <a16:colId xmlns:a16="http://schemas.microsoft.com/office/drawing/2014/main" val="2055770889"/>
+                    </a:ext>
+                  </a:extLst>
+                </a:gridCol>
+                <a:gridCol w="1084580">
+                  <a:extLst>
+                    <a:ext uri="{9D8B030D-6E8A-4147-A177-3AD203B41FA5}">
+                      <a16:colId xmlns:a16="http://schemas.microsoft.com/office/drawing/2014/main" val="1720904558"/>
+                    </a:ext>
+                  </a:extLst>
+                </a:gridCol>
+                <a:gridCol w="1084580">
+                  <a:extLst>
+                    <a:ext uri="{9D8B030D-6E8A-4147-A177-3AD203B41FA5}">
+                      <a16:colId xmlns:a16="http://schemas.microsoft.com/office/drawing/2014/main" val="1201651833"/>
+                    </a:ext>
+                  </a:extLst>
+                </a:gridCol>
+                <a:gridCol w="1084580">
+                  <a:extLst>
+                    <a:ext uri="{9D8B030D-6E8A-4147-A177-3AD203B41FA5}">
+                      <a16:colId xmlns:a16="http://schemas.microsoft.com/office/drawing/2014/main" val="3370663326"/>
+                    </a:ext>
+                  </a:extLst>
+                </a:gridCol>
+                <a:gridCol w="1084580">
+                  <a:extLst>
+                    <a:ext uri="{9D8B030D-6E8A-4147-A177-3AD203B41FA5}">
+                      <a16:colId xmlns:a16="http://schemas.microsoft.com/office/drawing/2014/main" val="363707457"/>
+                    </a:ext>
+                  </a:extLst>
+                </a:gridCol>
+              </a:tblGrid>
+              <a:tr h="370840">
+                <a:tc>
+                  <a:txBody>
+                    <a:bodyPr/>
+                    <a:lstStyle/>
+                    <a:p>
+                      <a:endParaRPr lang="en-US" dirty="0"/>
+                    </a:p>
+                  </a:txBody>
+                  <a:tcPr/>
+                </a:tc>
+                <a:tc>
+                  <a:txBody>
+                    <a:bodyPr/>
+                    <a:lstStyle/>
+                    <a:p>
+                      <a:endParaRPr lang="en-US" dirty="0"/>
+                    </a:p>
+                  </a:txBody>
+                  <a:tcPr/>
+                </a:tc>
+                <a:tc>
+                  <a:txBody>
+                    <a:bodyPr/>
+                    <a:lstStyle/>
+                    <a:p>
+                      <a:endParaRPr lang="en-US" dirty="0"/>
+                    </a:p>
+                  </a:txBody>
+                  <a:tcPr/>
+                </a:tc>
+                <a:tc>
+                  <a:txBody>
+                    <a:bodyPr/>
+                    <a:lstStyle/>
+                    <a:p>
+                      <a:endParaRPr lang="en-US" dirty="0"/>
+                    </a:p>
+                  </a:txBody>
+                  <a:tcPr/>
+                </a:tc>
+                <a:tc>
+                  <a:txBody>
+                    <a:bodyPr/>
+                    <a:lstStyle/>
+                    <a:p>
+                      <a:endParaRPr lang="en-US"/>
+                    </a:p>
+                  </a:txBody>
+                  <a:tcPr/>
+                </a:tc>
+                <a:extLst>
+                  <a:ext uri="{0D108BD9-81ED-4DB2-BD59-A6C34878D82A}">
+                    <a16:rowId xmlns:a16="http://schemas.microsoft.com/office/drawing/2014/main" val="3131565976"/>
+                  </a:ext>
+                </a:extLst>
+              </a:tr>
+              <a:tr h="370840">
+                <a:tc>
+                  <a:txBody>
+                    <a:bodyPr/>
+                    <a:lstStyle/>
+                    <a:p>
+                      <a:endParaRPr lang="en-US"/>
+                    </a:p>
+                  </a:txBody>
+                  <a:tcPr/>
+                </a:tc>
+                <a:tc>
+                  <a:txBody>
+                    <a:bodyPr/>
+                    <a:lstStyle/>
+                    <a:p>
+                      <a:endParaRPr lang="en-US" dirty="0"/>
+                    </a:p>
+                  </a:txBody>
+                  <a:tcPr/>
+                </a:tc>
+                <a:tc>
+                  <a:txBody>
+                    <a:bodyPr/>
+                    <a:lstStyle/>
+                    <a:p>
+                      <a:endParaRPr lang="en-US"/>
+                    </a:p>
+                  </a:txBody>
+                  <a:tcPr/>
+                </a:tc>
+                <a:tc>
+                  <a:txBody>
+                    <a:bodyPr/>
+                    <a:lstStyle/>
+                    <a:p>
+                      <a:endParaRPr lang="en-US"/>
+                    </a:p>
+                  </a:txBody>
+                  <a:tcPr/>
+                </a:tc>
+                <a:tc>
+                  <a:txBody>
+                    <a:bodyPr/>
+                    <a:lstStyle/>
+                    <a:p>
+                      <a:endParaRPr lang="en-US"/>
+                    </a:p>
+                  </a:txBody>
+                  <a:tcPr/>
+                </a:tc>
+                <a:extLst>
+                  <a:ext uri="{0D108BD9-81ED-4DB2-BD59-A6C34878D82A}">
+                    <a16:rowId xmlns:a16="http://schemas.microsoft.com/office/drawing/2014/main" val="2100756375"/>
+                  </a:ext>
+                </a:extLst>
+              </a:tr>
+            </a:tbl>
+          </a:graphicData>
+        </a:graphic>
+      </p:graphicFrame>
     </p:spTree>
     <p:extLst>
       <p:ext uri="{BB962C8B-B14F-4D97-AF65-F5344CB8AC3E}">
-        <p14:creationId xmlns:p14="http://schemas.microsoft.com/office/powerpoint/2010/main" val="3134922895"/>
+        <p14:creationId xmlns:p14="http://schemas.microsoft.com/office/powerpoint/2010/main" val="2308836746"/>
       </p:ext>
     </p:extLst>
   </p:cSld>
@@ -4739,10 +5504,10 @@
       </p:grpSpPr>
       <p:sp>
         <p:nvSpPr>
-          <p:cNvPr id="2" name="Title 1">
+          <p:cNvPr id="4" name="Title 3">
             <a:extLst>
               <a:ext uri="{FF2B5EF4-FFF2-40B4-BE49-F238E27FC236}">
-                <a16:creationId xmlns:a16="http://schemas.microsoft.com/office/drawing/2014/main" id="{7772DE01-3976-6141-852B-A445813FCE85}"/>
+                <a16:creationId xmlns:a16="http://schemas.microsoft.com/office/drawing/2014/main" id="{787CDE40-EB76-2043-B390-0B198F8A6BF9}"/>
               </a:ext>
             </a:extLst>
           </p:cNvPr>
@@ -4760,63 +5525,212 @@
           <a:p>
             <a:r>
               <a:rPr lang="en-US" dirty="0"/>
-              <a:t>Salaries in the top Industries</a:t>
-            </a:r>
-          </a:p>
-        </p:txBody>
-      </p:sp>
-      <p:sp>
-        <p:nvSpPr>
-          <p:cNvPr id="3" name="Content Placeholder 2">
+              <a:t>Cont’d</a:t>
+            </a:r>
+          </a:p>
+        </p:txBody>
+      </p:sp>
+      <p:graphicFrame>
+        <p:nvGraphicFramePr>
+          <p:cNvPr id="9" name="Content Placeholder 8">
             <a:extLst>
               <a:ext uri="{FF2B5EF4-FFF2-40B4-BE49-F238E27FC236}">
-                <a16:creationId xmlns:a16="http://schemas.microsoft.com/office/drawing/2014/main" id="{0784CB64-1A68-3A47-B46B-9273652DEFF9}"/>
+                <a16:creationId xmlns:a16="http://schemas.microsoft.com/office/drawing/2014/main" id="{1CC0423C-ACAB-AF4E-81C6-265C28549196}"/>
               </a:ext>
             </a:extLst>
           </p:cNvPr>
-          <p:cNvSpPr>
-            <a:spLocks noGrp="1"/>
-          </p:cNvSpPr>
-          <p:nvPr>
-            <p:ph idx="1"/>
-          </p:nvPr>
-        </p:nvSpPr>
-        <p:spPr>
-          <a:xfrm>
-            <a:off x="581192" y="2180496"/>
-            <a:ext cx="3859247" cy="3678303"/>
-          </a:xfrm>
-        </p:spPr>
-        <p:txBody>
-          <a:bodyPr/>
-          <a:lstStyle/>
-          <a:p>
-            <a:r>
-              <a:rPr lang="en-US" dirty="0"/>
-              <a:t>What is the distribution of “data jobs” in different industries?</a:t>
-            </a:r>
-          </a:p>
-          <a:p>
-            <a:r>
-              <a:rPr lang="en-US" dirty="0"/>
-              <a:t>Graph of total job counts in each industry</a:t>
-            </a:r>
-          </a:p>
-        </p:txBody>
-      </p:sp>
+          <p:cNvGraphicFramePr>
+            <a:graphicFrameLocks noGrp="1"/>
+          </p:cNvGraphicFramePr>
+          <p:nvPr>
+            <p:ph sz="half" idx="1"/>
+            <p:extLst>
+              <p:ext uri="{D42A27DB-BD31-4B8C-83A1-F6EECF244321}">
+                <p14:modId xmlns:p14="http://schemas.microsoft.com/office/powerpoint/2010/main" val="2081378397"/>
+              </p:ext>
+            </p:extLst>
+          </p:nvPr>
+        </p:nvGraphicFramePr>
+        <p:xfrm>
+          <a:off x="581025" y="2227263"/>
+          <a:ext cx="5422900" cy="741680"/>
+        </p:xfrm>
+        <a:graphic>
+          <a:graphicData uri="http://schemas.openxmlformats.org/drawingml/2006/table">
+            <a:tbl>
+              <a:tblPr firstRow="1" bandRow="1">
+                <a:tableStyleId>{5C22544A-7EE6-4342-B048-85BDC9FD1C3A}</a:tableStyleId>
+              </a:tblPr>
+              <a:tblGrid>
+                <a:gridCol w="1084580">
+                  <a:extLst>
+                    <a:ext uri="{9D8B030D-6E8A-4147-A177-3AD203B41FA5}">
+                      <a16:colId xmlns:a16="http://schemas.microsoft.com/office/drawing/2014/main" val="793060493"/>
+                    </a:ext>
+                  </a:extLst>
+                </a:gridCol>
+                <a:gridCol w="1084580">
+                  <a:extLst>
+                    <a:ext uri="{9D8B030D-6E8A-4147-A177-3AD203B41FA5}">
+                      <a16:colId xmlns:a16="http://schemas.microsoft.com/office/drawing/2014/main" val="3136255363"/>
+                    </a:ext>
+                  </a:extLst>
+                </a:gridCol>
+                <a:gridCol w="1084580">
+                  <a:extLst>
+                    <a:ext uri="{9D8B030D-6E8A-4147-A177-3AD203B41FA5}">
+                      <a16:colId xmlns:a16="http://schemas.microsoft.com/office/drawing/2014/main" val="492610594"/>
+                    </a:ext>
+                  </a:extLst>
+                </a:gridCol>
+                <a:gridCol w="1084580">
+                  <a:extLst>
+                    <a:ext uri="{9D8B030D-6E8A-4147-A177-3AD203B41FA5}">
+                      <a16:colId xmlns:a16="http://schemas.microsoft.com/office/drawing/2014/main" val="1365346981"/>
+                    </a:ext>
+                  </a:extLst>
+                </a:gridCol>
+                <a:gridCol w="1084580">
+                  <a:extLst>
+                    <a:ext uri="{9D8B030D-6E8A-4147-A177-3AD203B41FA5}">
+                      <a16:colId xmlns:a16="http://schemas.microsoft.com/office/drawing/2014/main" val="3686826634"/>
+                    </a:ext>
+                  </a:extLst>
+                </a:gridCol>
+              </a:tblGrid>
+              <a:tr h="370840">
+                <a:tc>
+                  <a:txBody>
+                    <a:bodyPr/>
+                    <a:lstStyle/>
+                    <a:p>
+                      <a:endParaRPr lang="en-US" dirty="0"/>
+                    </a:p>
+                  </a:txBody>
+                  <a:tcPr/>
+                </a:tc>
+                <a:tc>
+                  <a:txBody>
+                    <a:bodyPr/>
+                    <a:lstStyle/>
+                    <a:p>
+                      <a:endParaRPr lang="en-US"/>
+                    </a:p>
+                  </a:txBody>
+                  <a:tcPr/>
+                </a:tc>
+                <a:tc>
+                  <a:txBody>
+                    <a:bodyPr/>
+                    <a:lstStyle/>
+                    <a:p>
+                      <a:endParaRPr lang="en-US"/>
+                    </a:p>
+                  </a:txBody>
+                  <a:tcPr/>
+                </a:tc>
+                <a:tc>
+                  <a:txBody>
+                    <a:bodyPr/>
+                    <a:lstStyle/>
+                    <a:p>
+                      <a:endParaRPr lang="en-US"/>
+                    </a:p>
+                  </a:txBody>
+                  <a:tcPr/>
+                </a:tc>
+                <a:tc>
+                  <a:txBody>
+                    <a:bodyPr/>
+                    <a:lstStyle/>
+                    <a:p>
+                      <a:endParaRPr lang="en-US"/>
+                    </a:p>
+                  </a:txBody>
+                  <a:tcPr/>
+                </a:tc>
+                <a:extLst>
+                  <a:ext uri="{0D108BD9-81ED-4DB2-BD59-A6C34878D82A}">
+                    <a16:rowId xmlns:a16="http://schemas.microsoft.com/office/drawing/2014/main" val="4164071347"/>
+                  </a:ext>
+                </a:extLst>
+              </a:tr>
+              <a:tr h="370840">
+                <a:tc>
+                  <a:txBody>
+                    <a:bodyPr/>
+                    <a:lstStyle/>
+                    <a:p>
+                      <a:endParaRPr lang="en-US"/>
+                    </a:p>
+                  </a:txBody>
+                  <a:tcPr/>
+                </a:tc>
+                <a:tc>
+                  <a:txBody>
+                    <a:bodyPr/>
+                    <a:lstStyle/>
+                    <a:p>
+                      <a:endParaRPr lang="en-US"/>
+                    </a:p>
+                  </a:txBody>
+                  <a:tcPr/>
+                </a:tc>
+                <a:tc>
+                  <a:txBody>
+                    <a:bodyPr/>
+                    <a:lstStyle/>
+                    <a:p>
+                      <a:endParaRPr lang="en-US"/>
+                    </a:p>
+                  </a:txBody>
+                  <a:tcPr/>
+                </a:tc>
+                <a:tc>
+                  <a:txBody>
+                    <a:bodyPr/>
+                    <a:lstStyle/>
+                    <a:p>
+                      <a:endParaRPr lang="en-US"/>
+                    </a:p>
+                  </a:txBody>
+                  <a:tcPr/>
+                </a:tc>
+                <a:tc>
+                  <a:txBody>
+                    <a:bodyPr/>
+                    <a:lstStyle/>
+                    <a:p>
+                      <a:endParaRPr lang="en-US"/>
+                    </a:p>
+                  </a:txBody>
+                  <a:tcPr/>
+                </a:tc>
+                <a:extLst>
+                  <a:ext uri="{0D108BD9-81ED-4DB2-BD59-A6C34878D82A}">
+                    <a16:rowId xmlns:a16="http://schemas.microsoft.com/office/drawing/2014/main" val="2378478353"/>
+                  </a:ext>
+                </a:extLst>
+              </a:tr>
+            </a:tbl>
+          </a:graphicData>
+        </a:graphic>
+      </p:graphicFrame>
       <p:pic>
         <p:nvPicPr>
-          <p:cNvPr id="6" name="Picture 5">
+          <p:cNvPr id="8" name="Content Placeholder 7">
             <a:extLst>
               <a:ext uri="{FF2B5EF4-FFF2-40B4-BE49-F238E27FC236}">
-                <a16:creationId xmlns:a16="http://schemas.microsoft.com/office/drawing/2014/main" id="{BFC497FA-6A36-6849-9ADA-154239CFF4EB}"/>
+                <a16:creationId xmlns:a16="http://schemas.microsoft.com/office/drawing/2014/main" id="{EC1E1E44-95EA-1447-92E5-8B06A1CA5A0E}"/>
               </a:ext>
             </a:extLst>
           </p:cNvPr>
           <p:cNvPicPr>
-            <a:picLocks noChangeAspect="1"/>
+            <a:picLocks noGrp="1" noChangeAspect="1"/>
           </p:cNvPicPr>
-          <p:nvPr/>
+          <p:nvPr>
+            <p:ph sz="half" idx="2"/>
+          </p:nvPr>
         </p:nvPicPr>
         <p:blipFill>
           <a:blip r:embed="rId2"/>
@@ -4826,18 +5740,15 @@
         </p:blipFill>
         <p:spPr>
           <a:xfrm>
-            <a:off x="4440439" y="2180496"/>
-            <a:ext cx="7280772" cy="4078902"/>
+            <a:off x="6188075" y="2417286"/>
+            <a:ext cx="5422900" cy="3253740"/>
           </a:xfrm>
-          <a:prstGeom prst="rect">
-            <a:avLst/>
-          </a:prstGeom>
         </p:spPr>
       </p:pic>
     </p:spTree>
     <p:extLst>
       <p:ext uri="{BB962C8B-B14F-4D97-AF65-F5344CB8AC3E}">
-        <p14:creationId xmlns:p14="http://schemas.microsoft.com/office/powerpoint/2010/main" val="3532044637"/>
+        <p14:creationId xmlns:p14="http://schemas.microsoft.com/office/powerpoint/2010/main" val="1191203830"/>
       </p:ext>
     </p:extLst>
   </p:cSld>
@@ -4869,7 +5780,7 @@
           <p:cNvPr id="2" name="Title 1">
             <a:extLst>
               <a:ext uri="{FF2B5EF4-FFF2-40B4-BE49-F238E27FC236}">
-                <a16:creationId xmlns:a16="http://schemas.microsoft.com/office/drawing/2014/main" id="{7772DE01-3976-6141-852B-A445813FCE85}"/>
+                <a16:creationId xmlns:a16="http://schemas.microsoft.com/office/drawing/2014/main" id="{06B2E937-9870-2248-87E3-A795FE6E4D72}"/>
               </a:ext>
             </a:extLst>
           </p:cNvPr>
@@ -4887,7 +5798,7 @@
           <a:p>
             <a:r>
               <a:rPr lang="en-US" dirty="0"/>
-              <a:t>Data Analyst Salaries in the Top Industries</a:t>
+              <a:t>Skills vs salary</a:t>
             </a:r>
           </a:p>
         </p:txBody>
@@ -4897,7 +5808,7 @@
           <p:cNvPr id="3" name="Content Placeholder 2">
             <a:extLst>
               <a:ext uri="{FF2B5EF4-FFF2-40B4-BE49-F238E27FC236}">
-                <a16:creationId xmlns:a16="http://schemas.microsoft.com/office/drawing/2014/main" id="{0784CB64-1A68-3A47-B46B-9273652DEFF9}"/>
+                <a16:creationId xmlns:a16="http://schemas.microsoft.com/office/drawing/2014/main" id="{2535812B-CAD7-1E4B-91FF-F46634D0760B}"/>
               </a:ext>
             </a:extLst>
           </p:cNvPr>
@@ -4908,63 +5819,19 @@
             <p:ph idx="1"/>
           </p:nvPr>
         </p:nvSpPr>
-        <p:spPr>
-          <a:xfrm>
-            <a:off x="581192" y="2180496"/>
-            <a:ext cx="3859247" cy="3678303"/>
-          </a:xfrm>
-        </p:spPr>
-        <p:txBody>
-          <a:bodyPr/>
-          <a:lstStyle/>
-          <a:p>
-            <a:r>
-              <a:rPr lang="en-US" dirty="0"/>
-              <a:t>What is the distribution of “data jobs” in different industries?</a:t>
-            </a:r>
-          </a:p>
-          <a:p>
-            <a:r>
-              <a:rPr lang="en-US" dirty="0"/>
-              <a:t>Graph of total job counts in each industry</a:t>
-            </a:r>
-          </a:p>
-        </p:txBody>
-      </p:sp>
-      <p:pic>
-        <p:nvPicPr>
-          <p:cNvPr id="5" name="Picture 4">
-            <a:extLst>
-              <a:ext uri="{FF2B5EF4-FFF2-40B4-BE49-F238E27FC236}">
-                <a16:creationId xmlns:a16="http://schemas.microsoft.com/office/drawing/2014/main" id="{CBC0B245-D9A9-154A-AE4B-C722B7CF34F4}"/>
-              </a:ext>
-            </a:extLst>
-          </p:cNvPr>
-          <p:cNvPicPr>
-            <a:picLocks noChangeAspect="1"/>
-          </p:cNvPicPr>
-          <p:nvPr/>
-        </p:nvPicPr>
-        <p:blipFill>
-          <a:blip r:embed="rId2"/>
-          <a:stretch>
-            <a:fillRect/>
-          </a:stretch>
-        </p:blipFill>
-        <p:spPr>
-          <a:xfrm>
-            <a:off x="4440439" y="2162071"/>
-            <a:ext cx="7372974" cy="4153887"/>
-          </a:xfrm>
-          <a:prstGeom prst="rect">
-            <a:avLst/>
-          </a:prstGeom>
-        </p:spPr>
-      </p:pic>
+        <p:spPr/>
+        <p:txBody>
+          <a:bodyPr/>
+          <a:lstStyle/>
+          <a:p>
+            <a:endParaRPr lang="en-US"/>
+          </a:p>
+        </p:txBody>
+      </p:sp>
     </p:spTree>
     <p:extLst>
       <p:ext uri="{BB962C8B-B14F-4D97-AF65-F5344CB8AC3E}">
-        <p14:creationId xmlns:p14="http://schemas.microsoft.com/office/powerpoint/2010/main" val="492431831"/>
+        <p14:creationId xmlns:p14="http://schemas.microsoft.com/office/powerpoint/2010/main" val="3700835893"/>
       </p:ext>
     </p:extLst>
   </p:cSld>

</xml_diff>